<commit_message>
Actualización de CV y CP
</commit_message>
<xml_diff>
--- a/00soportes/CV/CV Pedro Bazo 2023-01-18.pptx
+++ b/00soportes/CV/CV Pedro Bazo 2023-01-18.pptx
@@ -222,7 +222,7 @@
           <a:p>
             <a:fld id="{1E5B1206-967F-4C5D-BDDE-8FB8311D7112}" type="datetimeFigureOut">
               <a:rPr lang="es-VE" smtClean="0"/>
-              <a:t>18/1/2023</a:t>
+              <a:t>19/1/2023</a:t>
             </a:fld>
             <a:endParaRPr lang="es-VE"/>
           </a:p>
@@ -669,7 +669,7 @@
           <a:p>
             <a:fld id="{7A847CFC-816F-41D0-AAC0-9BF4FEBC753E}" type="datetimeFigureOut">
               <a:rPr lang="es-ES" smtClean="0"/>
-              <a:t>18/01/2023</a:t>
+              <a:t>19/01/2023</a:t>
             </a:fld>
             <a:endParaRPr lang="es-ES"/>
           </a:p>
@@ -832,7 +832,7 @@
           <a:p>
             <a:fld id="{7A847CFC-816F-41D0-AAC0-9BF4FEBC753E}" type="datetimeFigureOut">
               <a:rPr lang="es-ES" smtClean="0"/>
-              <a:t>18/01/2023</a:t>
+              <a:t>19/01/2023</a:t>
             </a:fld>
             <a:endParaRPr lang="es-ES"/>
           </a:p>
@@ -1005,7 +1005,7 @@
           <a:p>
             <a:fld id="{7A847CFC-816F-41D0-AAC0-9BF4FEBC753E}" type="datetimeFigureOut">
               <a:rPr lang="es-ES" smtClean="0"/>
-              <a:t>18/01/2023</a:t>
+              <a:t>19/01/2023</a:t>
             </a:fld>
             <a:endParaRPr lang="es-ES"/>
           </a:p>
@@ -1168,7 +1168,7 @@
           <a:p>
             <a:fld id="{7A847CFC-816F-41D0-AAC0-9BF4FEBC753E}" type="datetimeFigureOut">
               <a:rPr lang="es-ES" smtClean="0"/>
-              <a:t>18/01/2023</a:t>
+              <a:t>19/01/2023</a:t>
             </a:fld>
             <a:endParaRPr lang="es-ES"/>
           </a:p>
@@ -1408,7 +1408,7 @@
           <a:p>
             <a:fld id="{7A847CFC-816F-41D0-AAC0-9BF4FEBC753E}" type="datetimeFigureOut">
               <a:rPr lang="es-ES" smtClean="0"/>
-              <a:t>18/01/2023</a:t>
+              <a:t>19/01/2023</a:t>
             </a:fld>
             <a:endParaRPr lang="es-ES"/>
           </a:p>
@@ -1688,7 +1688,7 @@
           <a:p>
             <a:fld id="{7A847CFC-816F-41D0-AAC0-9BF4FEBC753E}" type="datetimeFigureOut">
               <a:rPr lang="es-ES" smtClean="0"/>
-              <a:t>18/01/2023</a:t>
+              <a:t>19/01/2023</a:t>
             </a:fld>
             <a:endParaRPr lang="es-ES"/>
           </a:p>
@@ -2102,7 +2102,7 @@
           <a:p>
             <a:fld id="{7A847CFC-816F-41D0-AAC0-9BF4FEBC753E}" type="datetimeFigureOut">
               <a:rPr lang="es-ES" smtClean="0"/>
-              <a:t>18/01/2023</a:t>
+              <a:t>19/01/2023</a:t>
             </a:fld>
             <a:endParaRPr lang="es-ES"/>
           </a:p>
@@ -2214,7 +2214,7 @@
           <a:p>
             <a:fld id="{7A847CFC-816F-41D0-AAC0-9BF4FEBC753E}" type="datetimeFigureOut">
               <a:rPr lang="es-ES" smtClean="0"/>
-              <a:t>18/01/2023</a:t>
+              <a:t>19/01/2023</a:t>
             </a:fld>
             <a:endParaRPr lang="es-ES"/>
           </a:p>
@@ -2304,7 +2304,7 @@
           <a:p>
             <a:fld id="{7A847CFC-816F-41D0-AAC0-9BF4FEBC753E}" type="datetimeFigureOut">
               <a:rPr lang="es-ES" smtClean="0"/>
-              <a:t>18/01/2023</a:t>
+              <a:t>19/01/2023</a:t>
             </a:fld>
             <a:endParaRPr lang="es-ES"/>
           </a:p>
@@ -2574,7 +2574,7 @@
           <a:p>
             <a:fld id="{7A847CFC-816F-41D0-AAC0-9BF4FEBC753E}" type="datetimeFigureOut">
               <a:rPr lang="es-ES" smtClean="0"/>
-              <a:t>18/01/2023</a:t>
+              <a:t>19/01/2023</a:t>
             </a:fld>
             <a:endParaRPr lang="es-ES"/>
           </a:p>
@@ -2821,7 +2821,7 @@
           <a:p>
             <a:fld id="{7A847CFC-816F-41D0-AAC0-9BF4FEBC753E}" type="datetimeFigureOut">
               <a:rPr lang="es-ES" smtClean="0"/>
-              <a:t>18/01/2023</a:t>
+              <a:t>19/01/2023</a:t>
             </a:fld>
             <a:endParaRPr lang="es-ES"/>
           </a:p>
@@ -3027,7 +3027,7 @@
           <a:p>
             <a:fld id="{7A847CFC-816F-41D0-AAC0-9BF4FEBC753E}" type="datetimeFigureOut">
               <a:rPr lang="es-ES" smtClean="0"/>
-              <a:t>18/01/2023</a:t>
+              <a:t>19/01/2023</a:t>
             </a:fld>
             <a:endParaRPr lang="es-ES"/>
           </a:p>
@@ -7600,7 +7600,7 @@
             </a:r>
             <a:r>
               <a:rPr lang="es-ES" sz="700" dirty="0"/>
-              <a:t> Desarrollo de aplicaciones web, principalmente con el uso de las siguientes tecnologías: Laravel, Node.js, React.js, Vue.js, MySQL, MongoDB y AWS. Automatización de procesos y documentos con </a:t>
+              <a:t> Desarrollo y mantenimiento de aplicaciones web, principalmente con el uso de las siguientes tecnologías: Laravel, Node.js, React.js, Vue.js, MySQL, MongoDB y AWS. Automatización de procesos y documentos con </a:t>
             </a:r>
             <a:r>
               <a:rPr lang="es-ES" sz="700" dirty="0" err="1"/>

</xml_diff>